<commit_message>
update the image of handson env
</commit_message>
<xml_diff>
--- a/materials/images.pptx
+++ b/materials/images.pptx
@@ -104,6 +104,11 @@
       </a:defRPr>
     </a:lvl9pPr>
   </p:defaultTextStyle>
+  <p:extLst>
+    <p:ext uri="{EFAFB233-063F-42B5-8137-9DF3F51BA10A}">
+      <p15:sldGuideLst xmlns:p15="http://schemas.microsoft.com/office/powerpoint/2012/main"/>
+    </p:ext>
+  </p:extLst>
 </p:presentation>
 </file>
 
@@ -149,10 +154,9 @@
           </a:lstStyle>
           <a:p>
             <a:r>
-              <a:rPr kumimoji="1" lang="ja-JP" altLang="en-US" smtClean="0"/>
+              <a:rPr kumimoji="1" lang="ja-JP" altLang="en-US"/>
               <a:t>マスター タイトルの書式設定</a:t>
             </a:r>
-            <a:endParaRPr kumimoji="1" lang="ja-JP" altLang="en-US"/>
           </a:p>
         </p:txBody>
       </p:sp>
@@ -214,10 +218,9 @@
           </a:lstStyle>
           <a:p>
             <a:r>
-              <a:rPr kumimoji="1" lang="ja-JP" altLang="en-US" smtClean="0"/>
+              <a:rPr kumimoji="1" lang="ja-JP" altLang="en-US"/>
               <a:t>マスター サブタイトルの書式設定</a:t>
             </a:r>
-            <a:endParaRPr kumimoji="1" lang="ja-JP" altLang="en-US"/>
           </a:p>
         </p:txBody>
       </p:sp>
@@ -238,7 +241,7 @@
           <a:p>
             <a:fld id="{6A29D861-A055-3243-B891-3209160CEC37}" type="datetimeFigureOut">
               <a:rPr kumimoji="1" lang="ja-JP" altLang="en-US" smtClean="0"/>
-              <a:t>2018/1/11</a:t>
+              <a:t>2018/3/5</a:t>
             </a:fld>
             <a:endParaRPr kumimoji="1" lang="ja-JP" altLang="en-US"/>
           </a:p>
@@ -332,10 +335,9 @@
           <a:lstStyle/>
           <a:p>
             <a:r>
-              <a:rPr kumimoji="1" lang="ja-JP" altLang="en-US" smtClean="0"/>
+              <a:rPr kumimoji="1" lang="ja-JP" altLang="en-US"/>
               <a:t>マスター タイトルの書式設定</a:t>
             </a:r>
-            <a:endParaRPr kumimoji="1" lang="ja-JP" altLang="en-US"/>
           </a:p>
         </p:txBody>
       </p:sp>
@@ -356,70 +358,69 @@
           <a:p>
             <a:pPr lvl="0"/>
             <a:r>
-              <a:rPr kumimoji="1" lang="ja-JP" altLang="en-US" smtClean="0"/>
+              <a:rPr kumimoji="1" lang="ja-JP" altLang="en-US"/>
               <a:t>マスター テキストの書式設定</a:t>
             </a:r>
           </a:p>
           <a:p>
             <a:pPr lvl="1"/>
             <a:r>
-              <a:rPr kumimoji="1" lang="ja-JP" altLang="en-US" smtClean="0"/>
+              <a:rPr kumimoji="1" lang="ja-JP" altLang="en-US"/>
               <a:t>第 </a:t>
             </a:r>
             <a:r>
-              <a:rPr kumimoji="1" lang="en-US" altLang="ja-JP" smtClean="0"/>
+              <a:rPr kumimoji="1" lang="en-US" altLang="ja-JP"/>
               <a:t>2 </a:t>
             </a:r>
             <a:r>
-              <a:rPr kumimoji="1" lang="ja-JP" altLang="en-US" smtClean="0"/>
+              <a:rPr kumimoji="1" lang="ja-JP" altLang="en-US"/>
               <a:t>レベル</a:t>
             </a:r>
           </a:p>
           <a:p>
             <a:pPr lvl="2"/>
             <a:r>
-              <a:rPr kumimoji="1" lang="ja-JP" altLang="en-US" smtClean="0"/>
+              <a:rPr kumimoji="1" lang="ja-JP" altLang="en-US"/>
               <a:t>第 </a:t>
             </a:r>
             <a:r>
-              <a:rPr kumimoji="1" lang="en-US" altLang="ja-JP" smtClean="0"/>
+              <a:rPr kumimoji="1" lang="en-US" altLang="ja-JP"/>
               <a:t>3 </a:t>
             </a:r>
             <a:r>
-              <a:rPr kumimoji="1" lang="ja-JP" altLang="en-US" smtClean="0"/>
+              <a:rPr kumimoji="1" lang="ja-JP" altLang="en-US"/>
               <a:t>レベル</a:t>
             </a:r>
           </a:p>
           <a:p>
             <a:pPr lvl="3"/>
             <a:r>
-              <a:rPr kumimoji="1" lang="ja-JP" altLang="en-US" smtClean="0"/>
+              <a:rPr kumimoji="1" lang="ja-JP" altLang="en-US"/>
               <a:t>第 </a:t>
             </a:r>
             <a:r>
-              <a:rPr kumimoji="1" lang="en-US" altLang="ja-JP" smtClean="0"/>
+              <a:rPr kumimoji="1" lang="en-US" altLang="ja-JP"/>
               <a:t>4 </a:t>
             </a:r>
             <a:r>
-              <a:rPr kumimoji="1" lang="ja-JP" altLang="en-US" smtClean="0"/>
+              <a:rPr kumimoji="1" lang="ja-JP" altLang="en-US"/>
               <a:t>レベル</a:t>
             </a:r>
           </a:p>
           <a:p>
             <a:pPr lvl="4"/>
             <a:r>
-              <a:rPr kumimoji="1" lang="ja-JP" altLang="en-US" smtClean="0"/>
+              <a:rPr kumimoji="1" lang="ja-JP" altLang="en-US"/>
               <a:t>第 </a:t>
             </a:r>
             <a:r>
-              <a:rPr kumimoji="1" lang="en-US" altLang="ja-JP" smtClean="0"/>
+              <a:rPr kumimoji="1" lang="en-US" altLang="ja-JP"/>
               <a:t>5 </a:t>
             </a:r>
             <a:r>
-              <a:rPr kumimoji="1" lang="ja-JP" altLang="en-US" smtClean="0"/>
+              <a:rPr kumimoji="1" lang="ja-JP" altLang="en-US"/>
               <a:t>レベル</a:t>
             </a:r>
-            <a:endParaRPr kumimoji="1" lang="ja-JP" altLang="en-US"/>
           </a:p>
         </p:txBody>
       </p:sp>
@@ -440,7 +441,7 @@
           <a:p>
             <a:fld id="{6A29D861-A055-3243-B891-3209160CEC37}" type="datetimeFigureOut">
               <a:rPr kumimoji="1" lang="ja-JP" altLang="en-US" smtClean="0"/>
-              <a:t>2018/1/11</a:t>
+              <a:t>2018/3/5</a:t>
             </a:fld>
             <a:endParaRPr kumimoji="1" lang="ja-JP" altLang="en-US"/>
           </a:p>
@@ -539,10 +540,9 @@
           <a:lstStyle/>
           <a:p>
             <a:r>
-              <a:rPr kumimoji="1" lang="ja-JP" altLang="en-US" smtClean="0"/>
+              <a:rPr kumimoji="1" lang="ja-JP" altLang="en-US"/>
               <a:t>マスター タイトルの書式設定</a:t>
             </a:r>
-            <a:endParaRPr kumimoji="1" lang="ja-JP" altLang="en-US"/>
           </a:p>
         </p:txBody>
       </p:sp>
@@ -568,70 +568,69 @@
           <a:p>
             <a:pPr lvl="0"/>
             <a:r>
-              <a:rPr kumimoji="1" lang="ja-JP" altLang="en-US" smtClean="0"/>
+              <a:rPr kumimoji="1" lang="ja-JP" altLang="en-US"/>
               <a:t>マスター テキストの書式設定</a:t>
             </a:r>
           </a:p>
           <a:p>
             <a:pPr lvl="1"/>
             <a:r>
-              <a:rPr kumimoji="1" lang="ja-JP" altLang="en-US" smtClean="0"/>
+              <a:rPr kumimoji="1" lang="ja-JP" altLang="en-US"/>
               <a:t>第 </a:t>
             </a:r>
             <a:r>
-              <a:rPr kumimoji="1" lang="en-US" altLang="ja-JP" smtClean="0"/>
+              <a:rPr kumimoji="1" lang="en-US" altLang="ja-JP"/>
               <a:t>2 </a:t>
             </a:r>
             <a:r>
-              <a:rPr kumimoji="1" lang="ja-JP" altLang="en-US" smtClean="0"/>
+              <a:rPr kumimoji="1" lang="ja-JP" altLang="en-US"/>
               <a:t>レベル</a:t>
             </a:r>
           </a:p>
           <a:p>
             <a:pPr lvl="2"/>
             <a:r>
-              <a:rPr kumimoji="1" lang="ja-JP" altLang="en-US" smtClean="0"/>
+              <a:rPr kumimoji="1" lang="ja-JP" altLang="en-US"/>
               <a:t>第 </a:t>
             </a:r>
             <a:r>
-              <a:rPr kumimoji="1" lang="en-US" altLang="ja-JP" smtClean="0"/>
+              <a:rPr kumimoji="1" lang="en-US" altLang="ja-JP"/>
               <a:t>3 </a:t>
             </a:r>
             <a:r>
-              <a:rPr kumimoji="1" lang="ja-JP" altLang="en-US" smtClean="0"/>
+              <a:rPr kumimoji="1" lang="ja-JP" altLang="en-US"/>
               <a:t>レベル</a:t>
             </a:r>
           </a:p>
           <a:p>
             <a:pPr lvl="3"/>
             <a:r>
-              <a:rPr kumimoji="1" lang="ja-JP" altLang="en-US" smtClean="0"/>
+              <a:rPr kumimoji="1" lang="ja-JP" altLang="en-US"/>
               <a:t>第 </a:t>
             </a:r>
             <a:r>
-              <a:rPr kumimoji="1" lang="en-US" altLang="ja-JP" smtClean="0"/>
+              <a:rPr kumimoji="1" lang="en-US" altLang="ja-JP"/>
               <a:t>4 </a:t>
             </a:r>
             <a:r>
-              <a:rPr kumimoji="1" lang="ja-JP" altLang="en-US" smtClean="0"/>
+              <a:rPr kumimoji="1" lang="ja-JP" altLang="en-US"/>
               <a:t>レベル</a:t>
             </a:r>
           </a:p>
           <a:p>
             <a:pPr lvl="4"/>
             <a:r>
-              <a:rPr kumimoji="1" lang="ja-JP" altLang="en-US" smtClean="0"/>
+              <a:rPr kumimoji="1" lang="ja-JP" altLang="en-US"/>
               <a:t>第 </a:t>
             </a:r>
             <a:r>
-              <a:rPr kumimoji="1" lang="en-US" altLang="ja-JP" smtClean="0"/>
+              <a:rPr kumimoji="1" lang="en-US" altLang="ja-JP"/>
               <a:t>5 </a:t>
             </a:r>
             <a:r>
-              <a:rPr kumimoji="1" lang="ja-JP" altLang="en-US" smtClean="0"/>
+              <a:rPr kumimoji="1" lang="ja-JP" altLang="en-US"/>
               <a:t>レベル</a:t>
             </a:r>
-            <a:endParaRPr kumimoji="1" lang="ja-JP" altLang="en-US"/>
           </a:p>
         </p:txBody>
       </p:sp>
@@ -652,7 +651,7 @@
           <a:p>
             <a:fld id="{6A29D861-A055-3243-B891-3209160CEC37}" type="datetimeFigureOut">
               <a:rPr kumimoji="1" lang="ja-JP" altLang="en-US" smtClean="0"/>
-              <a:t>2018/1/11</a:t>
+              <a:t>2018/3/5</a:t>
             </a:fld>
             <a:endParaRPr kumimoji="1" lang="ja-JP" altLang="en-US"/>
           </a:p>
@@ -746,10 +745,9 @@
           <a:lstStyle/>
           <a:p>
             <a:r>
-              <a:rPr kumimoji="1" lang="ja-JP" altLang="en-US" smtClean="0"/>
+              <a:rPr kumimoji="1" lang="ja-JP" altLang="en-US"/>
               <a:t>マスター タイトルの書式設定</a:t>
             </a:r>
-            <a:endParaRPr kumimoji="1" lang="ja-JP" altLang="en-US"/>
           </a:p>
         </p:txBody>
       </p:sp>
@@ -770,70 +768,69 @@
           <a:p>
             <a:pPr lvl="0"/>
             <a:r>
-              <a:rPr kumimoji="1" lang="ja-JP" altLang="en-US" smtClean="0"/>
+              <a:rPr kumimoji="1" lang="ja-JP" altLang="en-US"/>
               <a:t>マスター テキストの書式設定</a:t>
             </a:r>
           </a:p>
           <a:p>
             <a:pPr lvl="1"/>
             <a:r>
-              <a:rPr kumimoji="1" lang="ja-JP" altLang="en-US" smtClean="0"/>
+              <a:rPr kumimoji="1" lang="ja-JP" altLang="en-US"/>
               <a:t>第 </a:t>
             </a:r>
             <a:r>
-              <a:rPr kumimoji="1" lang="en-US" altLang="ja-JP" smtClean="0"/>
+              <a:rPr kumimoji="1" lang="en-US" altLang="ja-JP"/>
               <a:t>2 </a:t>
             </a:r>
             <a:r>
-              <a:rPr kumimoji="1" lang="ja-JP" altLang="en-US" smtClean="0"/>
+              <a:rPr kumimoji="1" lang="ja-JP" altLang="en-US"/>
               <a:t>レベル</a:t>
             </a:r>
           </a:p>
           <a:p>
             <a:pPr lvl="2"/>
             <a:r>
-              <a:rPr kumimoji="1" lang="ja-JP" altLang="en-US" smtClean="0"/>
+              <a:rPr kumimoji="1" lang="ja-JP" altLang="en-US"/>
               <a:t>第 </a:t>
             </a:r>
             <a:r>
-              <a:rPr kumimoji="1" lang="en-US" altLang="ja-JP" smtClean="0"/>
+              <a:rPr kumimoji="1" lang="en-US" altLang="ja-JP"/>
               <a:t>3 </a:t>
             </a:r>
             <a:r>
-              <a:rPr kumimoji="1" lang="ja-JP" altLang="en-US" smtClean="0"/>
+              <a:rPr kumimoji="1" lang="ja-JP" altLang="en-US"/>
               <a:t>レベル</a:t>
             </a:r>
           </a:p>
           <a:p>
             <a:pPr lvl="3"/>
             <a:r>
-              <a:rPr kumimoji="1" lang="ja-JP" altLang="en-US" smtClean="0"/>
+              <a:rPr kumimoji="1" lang="ja-JP" altLang="en-US"/>
               <a:t>第 </a:t>
             </a:r>
             <a:r>
-              <a:rPr kumimoji="1" lang="en-US" altLang="ja-JP" smtClean="0"/>
+              <a:rPr kumimoji="1" lang="en-US" altLang="ja-JP"/>
               <a:t>4 </a:t>
             </a:r>
             <a:r>
-              <a:rPr kumimoji="1" lang="ja-JP" altLang="en-US" smtClean="0"/>
+              <a:rPr kumimoji="1" lang="ja-JP" altLang="en-US"/>
               <a:t>レベル</a:t>
             </a:r>
           </a:p>
           <a:p>
             <a:pPr lvl="4"/>
             <a:r>
-              <a:rPr kumimoji="1" lang="ja-JP" altLang="en-US" smtClean="0"/>
+              <a:rPr kumimoji="1" lang="ja-JP" altLang="en-US"/>
               <a:t>第 </a:t>
             </a:r>
             <a:r>
-              <a:rPr kumimoji="1" lang="en-US" altLang="ja-JP" smtClean="0"/>
+              <a:rPr kumimoji="1" lang="en-US" altLang="ja-JP"/>
               <a:t>5 </a:t>
             </a:r>
             <a:r>
-              <a:rPr kumimoji="1" lang="ja-JP" altLang="en-US" smtClean="0"/>
+              <a:rPr kumimoji="1" lang="ja-JP" altLang="en-US"/>
               <a:t>レベル</a:t>
             </a:r>
-            <a:endParaRPr kumimoji="1" lang="ja-JP" altLang="en-US"/>
           </a:p>
         </p:txBody>
       </p:sp>
@@ -854,7 +851,7 @@
           <a:p>
             <a:fld id="{6A29D861-A055-3243-B891-3209160CEC37}" type="datetimeFigureOut">
               <a:rPr kumimoji="1" lang="ja-JP" altLang="en-US" smtClean="0"/>
-              <a:t>2018/1/11</a:t>
+              <a:t>2018/3/5</a:t>
             </a:fld>
             <a:endParaRPr kumimoji="1" lang="ja-JP" altLang="en-US"/>
           </a:p>
@@ -957,10 +954,9 @@
           </a:lstStyle>
           <a:p>
             <a:r>
-              <a:rPr kumimoji="1" lang="ja-JP" altLang="en-US" smtClean="0"/>
+              <a:rPr kumimoji="1" lang="ja-JP" altLang="en-US"/>
               <a:t>マスター タイトルの書式設定</a:t>
             </a:r>
-            <a:endParaRPr kumimoji="1" lang="ja-JP" altLang="en-US"/>
           </a:p>
         </p:txBody>
       </p:sp>
@@ -1077,7 +1073,7 @@
           <a:p>
             <a:pPr lvl="0"/>
             <a:r>
-              <a:rPr kumimoji="1" lang="ja-JP" altLang="en-US" smtClean="0"/>
+              <a:rPr kumimoji="1" lang="ja-JP" altLang="en-US"/>
               <a:t>マスター テキストの書式設定</a:t>
             </a:r>
           </a:p>
@@ -1100,7 +1096,7 @@
           <a:p>
             <a:fld id="{6A29D861-A055-3243-B891-3209160CEC37}" type="datetimeFigureOut">
               <a:rPr kumimoji="1" lang="ja-JP" altLang="en-US" smtClean="0"/>
-              <a:t>2018/1/11</a:t>
+              <a:t>2018/3/5</a:t>
             </a:fld>
             <a:endParaRPr kumimoji="1" lang="ja-JP" altLang="en-US"/>
           </a:p>
@@ -1194,10 +1190,9 @@
           <a:lstStyle/>
           <a:p>
             <a:r>
-              <a:rPr kumimoji="1" lang="ja-JP" altLang="en-US" smtClean="0"/>
+              <a:rPr kumimoji="1" lang="ja-JP" altLang="en-US"/>
               <a:t>マスター タイトルの書式設定</a:t>
             </a:r>
-            <a:endParaRPr kumimoji="1" lang="ja-JP" altLang="en-US"/>
           </a:p>
         </p:txBody>
       </p:sp>
@@ -1223,70 +1218,69 @@
           <a:p>
             <a:pPr lvl="0"/>
             <a:r>
-              <a:rPr kumimoji="1" lang="ja-JP" altLang="en-US" smtClean="0"/>
+              <a:rPr kumimoji="1" lang="ja-JP" altLang="en-US"/>
               <a:t>マスター テキストの書式設定</a:t>
             </a:r>
           </a:p>
           <a:p>
             <a:pPr lvl="1"/>
             <a:r>
-              <a:rPr kumimoji="1" lang="ja-JP" altLang="en-US" smtClean="0"/>
+              <a:rPr kumimoji="1" lang="ja-JP" altLang="en-US"/>
               <a:t>第 </a:t>
             </a:r>
             <a:r>
-              <a:rPr kumimoji="1" lang="en-US" altLang="ja-JP" smtClean="0"/>
+              <a:rPr kumimoji="1" lang="en-US" altLang="ja-JP"/>
               <a:t>2 </a:t>
             </a:r>
             <a:r>
-              <a:rPr kumimoji="1" lang="ja-JP" altLang="en-US" smtClean="0"/>
+              <a:rPr kumimoji="1" lang="ja-JP" altLang="en-US"/>
               <a:t>レベル</a:t>
             </a:r>
           </a:p>
           <a:p>
             <a:pPr lvl="2"/>
             <a:r>
-              <a:rPr kumimoji="1" lang="ja-JP" altLang="en-US" smtClean="0"/>
+              <a:rPr kumimoji="1" lang="ja-JP" altLang="en-US"/>
               <a:t>第 </a:t>
             </a:r>
             <a:r>
-              <a:rPr kumimoji="1" lang="en-US" altLang="ja-JP" smtClean="0"/>
+              <a:rPr kumimoji="1" lang="en-US" altLang="ja-JP"/>
               <a:t>3 </a:t>
             </a:r>
             <a:r>
-              <a:rPr kumimoji="1" lang="ja-JP" altLang="en-US" smtClean="0"/>
+              <a:rPr kumimoji="1" lang="ja-JP" altLang="en-US"/>
               <a:t>レベル</a:t>
             </a:r>
           </a:p>
           <a:p>
             <a:pPr lvl="3"/>
             <a:r>
-              <a:rPr kumimoji="1" lang="ja-JP" altLang="en-US" smtClean="0"/>
+              <a:rPr kumimoji="1" lang="ja-JP" altLang="en-US"/>
               <a:t>第 </a:t>
             </a:r>
             <a:r>
-              <a:rPr kumimoji="1" lang="en-US" altLang="ja-JP" smtClean="0"/>
+              <a:rPr kumimoji="1" lang="en-US" altLang="ja-JP"/>
               <a:t>4 </a:t>
             </a:r>
             <a:r>
-              <a:rPr kumimoji="1" lang="ja-JP" altLang="en-US" smtClean="0"/>
+              <a:rPr kumimoji="1" lang="ja-JP" altLang="en-US"/>
               <a:t>レベル</a:t>
             </a:r>
           </a:p>
           <a:p>
             <a:pPr lvl="4"/>
             <a:r>
-              <a:rPr kumimoji="1" lang="ja-JP" altLang="en-US" smtClean="0"/>
+              <a:rPr kumimoji="1" lang="ja-JP" altLang="en-US"/>
               <a:t>第 </a:t>
             </a:r>
             <a:r>
-              <a:rPr kumimoji="1" lang="en-US" altLang="ja-JP" smtClean="0"/>
+              <a:rPr kumimoji="1" lang="en-US" altLang="ja-JP"/>
               <a:t>5 </a:t>
             </a:r>
             <a:r>
-              <a:rPr kumimoji="1" lang="ja-JP" altLang="en-US" smtClean="0"/>
+              <a:rPr kumimoji="1" lang="ja-JP" altLang="en-US"/>
               <a:t>レベル</a:t>
             </a:r>
-            <a:endParaRPr kumimoji="1" lang="ja-JP" altLang="en-US"/>
           </a:p>
         </p:txBody>
       </p:sp>
@@ -1312,70 +1306,69 @@
           <a:p>
             <a:pPr lvl="0"/>
             <a:r>
-              <a:rPr kumimoji="1" lang="ja-JP" altLang="en-US" smtClean="0"/>
+              <a:rPr kumimoji="1" lang="ja-JP" altLang="en-US"/>
               <a:t>マスター テキストの書式設定</a:t>
             </a:r>
           </a:p>
           <a:p>
             <a:pPr lvl="1"/>
             <a:r>
-              <a:rPr kumimoji="1" lang="ja-JP" altLang="en-US" smtClean="0"/>
+              <a:rPr kumimoji="1" lang="ja-JP" altLang="en-US"/>
               <a:t>第 </a:t>
             </a:r>
             <a:r>
-              <a:rPr kumimoji="1" lang="en-US" altLang="ja-JP" smtClean="0"/>
+              <a:rPr kumimoji="1" lang="en-US" altLang="ja-JP"/>
               <a:t>2 </a:t>
             </a:r>
             <a:r>
-              <a:rPr kumimoji="1" lang="ja-JP" altLang="en-US" smtClean="0"/>
+              <a:rPr kumimoji="1" lang="ja-JP" altLang="en-US"/>
               <a:t>レベル</a:t>
             </a:r>
           </a:p>
           <a:p>
             <a:pPr lvl="2"/>
             <a:r>
-              <a:rPr kumimoji="1" lang="ja-JP" altLang="en-US" smtClean="0"/>
+              <a:rPr kumimoji="1" lang="ja-JP" altLang="en-US"/>
               <a:t>第 </a:t>
             </a:r>
             <a:r>
-              <a:rPr kumimoji="1" lang="en-US" altLang="ja-JP" smtClean="0"/>
+              <a:rPr kumimoji="1" lang="en-US" altLang="ja-JP"/>
               <a:t>3 </a:t>
             </a:r>
             <a:r>
-              <a:rPr kumimoji="1" lang="ja-JP" altLang="en-US" smtClean="0"/>
+              <a:rPr kumimoji="1" lang="ja-JP" altLang="en-US"/>
               <a:t>レベル</a:t>
             </a:r>
           </a:p>
           <a:p>
             <a:pPr lvl="3"/>
             <a:r>
-              <a:rPr kumimoji="1" lang="ja-JP" altLang="en-US" smtClean="0"/>
+              <a:rPr kumimoji="1" lang="ja-JP" altLang="en-US"/>
               <a:t>第 </a:t>
             </a:r>
             <a:r>
-              <a:rPr kumimoji="1" lang="en-US" altLang="ja-JP" smtClean="0"/>
+              <a:rPr kumimoji="1" lang="en-US" altLang="ja-JP"/>
               <a:t>4 </a:t>
             </a:r>
             <a:r>
-              <a:rPr kumimoji="1" lang="ja-JP" altLang="en-US" smtClean="0"/>
+              <a:rPr kumimoji="1" lang="ja-JP" altLang="en-US"/>
               <a:t>レベル</a:t>
             </a:r>
           </a:p>
           <a:p>
             <a:pPr lvl="4"/>
             <a:r>
-              <a:rPr kumimoji="1" lang="ja-JP" altLang="en-US" smtClean="0"/>
+              <a:rPr kumimoji="1" lang="ja-JP" altLang="en-US"/>
               <a:t>第 </a:t>
             </a:r>
             <a:r>
-              <a:rPr kumimoji="1" lang="en-US" altLang="ja-JP" smtClean="0"/>
+              <a:rPr kumimoji="1" lang="en-US" altLang="ja-JP"/>
               <a:t>5 </a:t>
             </a:r>
             <a:r>
-              <a:rPr kumimoji="1" lang="ja-JP" altLang="en-US" smtClean="0"/>
+              <a:rPr kumimoji="1" lang="ja-JP" altLang="en-US"/>
               <a:t>レベル</a:t>
             </a:r>
-            <a:endParaRPr kumimoji="1" lang="ja-JP" altLang="en-US"/>
           </a:p>
         </p:txBody>
       </p:sp>
@@ -1396,7 +1389,7 @@
           <a:p>
             <a:fld id="{6A29D861-A055-3243-B891-3209160CEC37}" type="datetimeFigureOut">
               <a:rPr kumimoji="1" lang="ja-JP" altLang="en-US" smtClean="0"/>
-              <a:t>2018/1/11</a:t>
+              <a:t>2018/3/5</a:t>
             </a:fld>
             <a:endParaRPr kumimoji="1" lang="ja-JP" altLang="en-US"/>
           </a:p>
@@ -1495,10 +1488,9 @@
           <a:lstStyle/>
           <a:p>
             <a:r>
-              <a:rPr kumimoji="1" lang="ja-JP" altLang="en-US" smtClean="0"/>
+              <a:rPr kumimoji="1" lang="ja-JP" altLang="en-US"/>
               <a:t>マスター タイトルの書式設定</a:t>
             </a:r>
-            <a:endParaRPr kumimoji="1" lang="ja-JP" altLang="en-US"/>
           </a:p>
         </p:txBody>
       </p:sp>
@@ -1561,7 +1553,7 @@
           <a:p>
             <a:pPr lvl="0"/>
             <a:r>
-              <a:rPr kumimoji="1" lang="ja-JP" altLang="en-US" smtClean="0"/>
+              <a:rPr kumimoji="1" lang="ja-JP" altLang="en-US"/>
               <a:t>マスター テキストの書式設定</a:t>
             </a:r>
           </a:p>
@@ -1589,70 +1581,69 @@
           <a:p>
             <a:pPr lvl="0"/>
             <a:r>
-              <a:rPr kumimoji="1" lang="ja-JP" altLang="en-US" smtClean="0"/>
+              <a:rPr kumimoji="1" lang="ja-JP" altLang="en-US"/>
               <a:t>マスター テキストの書式設定</a:t>
             </a:r>
           </a:p>
           <a:p>
             <a:pPr lvl="1"/>
             <a:r>
-              <a:rPr kumimoji="1" lang="ja-JP" altLang="en-US" smtClean="0"/>
+              <a:rPr kumimoji="1" lang="ja-JP" altLang="en-US"/>
               <a:t>第 </a:t>
             </a:r>
             <a:r>
-              <a:rPr kumimoji="1" lang="en-US" altLang="ja-JP" smtClean="0"/>
+              <a:rPr kumimoji="1" lang="en-US" altLang="ja-JP"/>
               <a:t>2 </a:t>
             </a:r>
             <a:r>
-              <a:rPr kumimoji="1" lang="ja-JP" altLang="en-US" smtClean="0"/>
+              <a:rPr kumimoji="1" lang="ja-JP" altLang="en-US"/>
               <a:t>レベル</a:t>
             </a:r>
           </a:p>
           <a:p>
             <a:pPr lvl="2"/>
             <a:r>
-              <a:rPr kumimoji="1" lang="ja-JP" altLang="en-US" smtClean="0"/>
+              <a:rPr kumimoji="1" lang="ja-JP" altLang="en-US"/>
               <a:t>第 </a:t>
             </a:r>
             <a:r>
-              <a:rPr kumimoji="1" lang="en-US" altLang="ja-JP" smtClean="0"/>
+              <a:rPr kumimoji="1" lang="en-US" altLang="ja-JP"/>
               <a:t>3 </a:t>
             </a:r>
             <a:r>
-              <a:rPr kumimoji="1" lang="ja-JP" altLang="en-US" smtClean="0"/>
+              <a:rPr kumimoji="1" lang="ja-JP" altLang="en-US"/>
               <a:t>レベル</a:t>
             </a:r>
           </a:p>
           <a:p>
             <a:pPr lvl="3"/>
             <a:r>
-              <a:rPr kumimoji="1" lang="ja-JP" altLang="en-US" smtClean="0"/>
+              <a:rPr kumimoji="1" lang="ja-JP" altLang="en-US"/>
               <a:t>第 </a:t>
             </a:r>
             <a:r>
-              <a:rPr kumimoji="1" lang="en-US" altLang="ja-JP" smtClean="0"/>
+              <a:rPr kumimoji="1" lang="en-US" altLang="ja-JP"/>
               <a:t>4 </a:t>
             </a:r>
             <a:r>
-              <a:rPr kumimoji="1" lang="ja-JP" altLang="en-US" smtClean="0"/>
+              <a:rPr kumimoji="1" lang="ja-JP" altLang="en-US"/>
               <a:t>レベル</a:t>
             </a:r>
           </a:p>
           <a:p>
             <a:pPr lvl="4"/>
             <a:r>
-              <a:rPr kumimoji="1" lang="ja-JP" altLang="en-US" smtClean="0"/>
+              <a:rPr kumimoji="1" lang="ja-JP" altLang="en-US"/>
               <a:t>第 </a:t>
             </a:r>
             <a:r>
-              <a:rPr kumimoji="1" lang="en-US" altLang="ja-JP" smtClean="0"/>
+              <a:rPr kumimoji="1" lang="en-US" altLang="ja-JP"/>
               <a:t>5 </a:t>
             </a:r>
             <a:r>
-              <a:rPr kumimoji="1" lang="ja-JP" altLang="en-US" smtClean="0"/>
+              <a:rPr kumimoji="1" lang="ja-JP" altLang="en-US"/>
               <a:t>レベル</a:t>
             </a:r>
-            <a:endParaRPr kumimoji="1" lang="ja-JP" altLang="en-US"/>
           </a:p>
         </p:txBody>
       </p:sp>
@@ -1715,7 +1706,7 @@
           <a:p>
             <a:pPr lvl="0"/>
             <a:r>
-              <a:rPr kumimoji="1" lang="ja-JP" altLang="en-US" smtClean="0"/>
+              <a:rPr kumimoji="1" lang="ja-JP" altLang="en-US"/>
               <a:t>マスター テキストの書式設定</a:t>
             </a:r>
           </a:p>
@@ -1743,70 +1734,69 @@
           <a:p>
             <a:pPr lvl="0"/>
             <a:r>
-              <a:rPr kumimoji="1" lang="ja-JP" altLang="en-US" smtClean="0"/>
+              <a:rPr kumimoji="1" lang="ja-JP" altLang="en-US"/>
               <a:t>マスター テキストの書式設定</a:t>
             </a:r>
           </a:p>
           <a:p>
             <a:pPr lvl="1"/>
             <a:r>
-              <a:rPr kumimoji="1" lang="ja-JP" altLang="en-US" smtClean="0"/>
+              <a:rPr kumimoji="1" lang="ja-JP" altLang="en-US"/>
               <a:t>第 </a:t>
             </a:r>
             <a:r>
-              <a:rPr kumimoji="1" lang="en-US" altLang="ja-JP" smtClean="0"/>
+              <a:rPr kumimoji="1" lang="en-US" altLang="ja-JP"/>
               <a:t>2 </a:t>
             </a:r>
             <a:r>
-              <a:rPr kumimoji="1" lang="ja-JP" altLang="en-US" smtClean="0"/>
+              <a:rPr kumimoji="1" lang="ja-JP" altLang="en-US"/>
               <a:t>レベル</a:t>
             </a:r>
           </a:p>
           <a:p>
             <a:pPr lvl="2"/>
             <a:r>
-              <a:rPr kumimoji="1" lang="ja-JP" altLang="en-US" smtClean="0"/>
+              <a:rPr kumimoji="1" lang="ja-JP" altLang="en-US"/>
               <a:t>第 </a:t>
             </a:r>
             <a:r>
-              <a:rPr kumimoji="1" lang="en-US" altLang="ja-JP" smtClean="0"/>
+              <a:rPr kumimoji="1" lang="en-US" altLang="ja-JP"/>
               <a:t>3 </a:t>
             </a:r>
             <a:r>
-              <a:rPr kumimoji="1" lang="ja-JP" altLang="en-US" smtClean="0"/>
+              <a:rPr kumimoji="1" lang="ja-JP" altLang="en-US"/>
               <a:t>レベル</a:t>
             </a:r>
           </a:p>
           <a:p>
             <a:pPr lvl="3"/>
             <a:r>
-              <a:rPr kumimoji="1" lang="ja-JP" altLang="en-US" smtClean="0"/>
+              <a:rPr kumimoji="1" lang="ja-JP" altLang="en-US"/>
               <a:t>第 </a:t>
             </a:r>
             <a:r>
-              <a:rPr kumimoji="1" lang="en-US" altLang="ja-JP" smtClean="0"/>
+              <a:rPr kumimoji="1" lang="en-US" altLang="ja-JP"/>
               <a:t>4 </a:t>
             </a:r>
             <a:r>
-              <a:rPr kumimoji="1" lang="ja-JP" altLang="en-US" smtClean="0"/>
+              <a:rPr kumimoji="1" lang="ja-JP" altLang="en-US"/>
               <a:t>レベル</a:t>
             </a:r>
           </a:p>
           <a:p>
             <a:pPr lvl="4"/>
             <a:r>
-              <a:rPr kumimoji="1" lang="ja-JP" altLang="en-US" smtClean="0"/>
+              <a:rPr kumimoji="1" lang="ja-JP" altLang="en-US"/>
               <a:t>第 </a:t>
             </a:r>
             <a:r>
-              <a:rPr kumimoji="1" lang="en-US" altLang="ja-JP" smtClean="0"/>
+              <a:rPr kumimoji="1" lang="en-US" altLang="ja-JP"/>
               <a:t>5 </a:t>
             </a:r>
             <a:r>
-              <a:rPr kumimoji="1" lang="ja-JP" altLang="en-US" smtClean="0"/>
+              <a:rPr kumimoji="1" lang="ja-JP" altLang="en-US"/>
               <a:t>レベル</a:t>
             </a:r>
-            <a:endParaRPr kumimoji="1" lang="ja-JP" altLang="en-US"/>
           </a:p>
         </p:txBody>
       </p:sp>
@@ -1827,7 +1817,7 @@
           <a:p>
             <a:fld id="{6A29D861-A055-3243-B891-3209160CEC37}" type="datetimeFigureOut">
               <a:rPr kumimoji="1" lang="ja-JP" altLang="en-US" smtClean="0"/>
-              <a:t>2018/1/11</a:t>
+              <a:t>2018/3/5</a:t>
             </a:fld>
             <a:endParaRPr kumimoji="1" lang="ja-JP" altLang="en-US"/>
           </a:p>
@@ -1921,10 +1911,9 @@
           <a:lstStyle/>
           <a:p>
             <a:r>
-              <a:rPr kumimoji="1" lang="ja-JP" altLang="en-US" smtClean="0"/>
+              <a:rPr kumimoji="1" lang="ja-JP" altLang="en-US"/>
               <a:t>マスター タイトルの書式設定</a:t>
             </a:r>
-            <a:endParaRPr kumimoji="1" lang="ja-JP" altLang="en-US"/>
           </a:p>
         </p:txBody>
       </p:sp>
@@ -1945,7 +1934,7 @@
           <a:p>
             <a:fld id="{6A29D861-A055-3243-B891-3209160CEC37}" type="datetimeFigureOut">
               <a:rPr kumimoji="1" lang="ja-JP" altLang="en-US" smtClean="0"/>
-              <a:t>2018/1/11</a:t>
+              <a:t>2018/3/5</a:t>
             </a:fld>
             <a:endParaRPr kumimoji="1" lang="ja-JP" altLang="en-US"/>
           </a:p>
@@ -2040,7 +2029,7 @@
           <a:p>
             <a:fld id="{6A29D861-A055-3243-B891-3209160CEC37}" type="datetimeFigureOut">
               <a:rPr kumimoji="1" lang="ja-JP" altLang="en-US" smtClean="0"/>
-              <a:t>2018/1/11</a:t>
+              <a:t>2018/3/5</a:t>
             </a:fld>
             <a:endParaRPr kumimoji="1" lang="ja-JP" altLang="en-US"/>
           </a:p>
@@ -2143,10 +2132,9 @@
           </a:lstStyle>
           <a:p>
             <a:r>
-              <a:rPr kumimoji="1" lang="ja-JP" altLang="en-US" smtClean="0"/>
+              <a:rPr kumimoji="1" lang="ja-JP" altLang="en-US"/>
               <a:t>マスター タイトルの書式設定</a:t>
             </a:r>
-            <a:endParaRPr kumimoji="1" lang="ja-JP" altLang="en-US"/>
           </a:p>
         </p:txBody>
       </p:sp>
@@ -2200,70 +2188,69 @@
           <a:p>
             <a:pPr lvl="0"/>
             <a:r>
-              <a:rPr kumimoji="1" lang="ja-JP" altLang="en-US" smtClean="0"/>
+              <a:rPr kumimoji="1" lang="ja-JP" altLang="en-US"/>
               <a:t>マスター テキストの書式設定</a:t>
             </a:r>
           </a:p>
           <a:p>
             <a:pPr lvl="1"/>
             <a:r>
-              <a:rPr kumimoji="1" lang="ja-JP" altLang="en-US" smtClean="0"/>
+              <a:rPr kumimoji="1" lang="ja-JP" altLang="en-US"/>
               <a:t>第 </a:t>
             </a:r>
             <a:r>
-              <a:rPr kumimoji="1" lang="en-US" altLang="ja-JP" smtClean="0"/>
+              <a:rPr kumimoji="1" lang="en-US" altLang="ja-JP"/>
               <a:t>2 </a:t>
             </a:r>
             <a:r>
-              <a:rPr kumimoji="1" lang="ja-JP" altLang="en-US" smtClean="0"/>
+              <a:rPr kumimoji="1" lang="ja-JP" altLang="en-US"/>
               <a:t>レベル</a:t>
             </a:r>
           </a:p>
           <a:p>
             <a:pPr lvl="2"/>
             <a:r>
-              <a:rPr kumimoji="1" lang="ja-JP" altLang="en-US" smtClean="0"/>
+              <a:rPr kumimoji="1" lang="ja-JP" altLang="en-US"/>
               <a:t>第 </a:t>
             </a:r>
             <a:r>
-              <a:rPr kumimoji="1" lang="en-US" altLang="ja-JP" smtClean="0"/>
+              <a:rPr kumimoji="1" lang="en-US" altLang="ja-JP"/>
               <a:t>3 </a:t>
             </a:r>
             <a:r>
-              <a:rPr kumimoji="1" lang="ja-JP" altLang="en-US" smtClean="0"/>
+              <a:rPr kumimoji="1" lang="ja-JP" altLang="en-US"/>
               <a:t>レベル</a:t>
             </a:r>
           </a:p>
           <a:p>
             <a:pPr lvl="3"/>
             <a:r>
-              <a:rPr kumimoji="1" lang="ja-JP" altLang="en-US" smtClean="0"/>
+              <a:rPr kumimoji="1" lang="ja-JP" altLang="en-US"/>
               <a:t>第 </a:t>
             </a:r>
             <a:r>
-              <a:rPr kumimoji="1" lang="en-US" altLang="ja-JP" smtClean="0"/>
+              <a:rPr kumimoji="1" lang="en-US" altLang="ja-JP"/>
               <a:t>4 </a:t>
             </a:r>
             <a:r>
-              <a:rPr kumimoji="1" lang="ja-JP" altLang="en-US" smtClean="0"/>
+              <a:rPr kumimoji="1" lang="ja-JP" altLang="en-US"/>
               <a:t>レベル</a:t>
             </a:r>
           </a:p>
           <a:p>
             <a:pPr lvl="4"/>
             <a:r>
-              <a:rPr kumimoji="1" lang="ja-JP" altLang="en-US" smtClean="0"/>
+              <a:rPr kumimoji="1" lang="ja-JP" altLang="en-US"/>
               <a:t>第 </a:t>
             </a:r>
             <a:r>
-              <a:rPr kumimoji="1" lang="en-US" altLang="ja-JP" smtClean="0"/>
+              <a:rPr kumimoji="1" lang="en-US" altLang="ja-JP"/>
               <a:t>5 </a:t>
             </a:r>
             <a:r>
-              <a:rPr kumimoji="1" lang="ja-JP" altLang="en-US" smtClean="0"/>
+              <a:rPr kumimoji="1" lang="ja-JP" altLang="en-US"/>
               <a:t>レベル</a:t>
             </a:r>
-            <a:endParaRPr kumimoji="1" lang="ja-JP" altLang="en-US"/>
           </a:p>
         </p:txBody>
       </p:sp>
@@ -2326,7 +2313,7 @@
           <a:p>
             <a:pPr lvl="0"/>
             <a:r>
-              <a:rPr kumimoji="1" lang="ja-JP" altLang="en-US" smtClean="0"/>
+              <a:rPr kumimoji="1" lang="ja-JP" altLang="en-US"/>
               <a:t>マスター テキストの書式設定</a:t>
             </a:r>
           </a:p>
@@ -2349,7 +2336,7 @@
           <a:p>
             <a:fld id="{6A29D861-A055-3243-B891-3209160CEC37}" type="datetimeFigureOut">
               <a:rPr kumimoji="1" lang="ja-JP" altLang="en-US" smtClean="0"/>
-              <a:t>2018/1/11</a:t>
+              <a:t>2018/3/5</a:t>
             </a:fld>
             <a:endParaRPr kumimoji="1" lang="ja-JP" altLang="en-US"/>
           </a:p>
@@ -2452,10 +2439,9 @@
           </a:lstStyle>
           <a:p>
             <a:r>
-              <a:rPr kumimoji="1" lang="ja-JP" altLang="en-US" smtClean="0"/>
+              <a:rPr kumimoji="1" lang="ja-JP" altLang="en-US"/>
               <a:t>マスター タイトルの書式設定</a:t>
             </a:r>
-            <a:endParaRPr kumimoji="1" lang="ja-JP" altLang="en-US"/>
           </a:p>
         </p:txBody>
       </p:sp>
@@ -2579,7 +2565,7 @@
           <a:p>
             <a:pPr lvl="0"/>
             <a:r>
-              <a:rPr kumimoji="1" lang="ja-JP" altLang="en-US" smtClean="0"/>
+              <a:rPr kumimoji="1" lang="ja-JP" altLang="en-US"/>
               <a:t>マスター テキストの書式設定</a:t>
             </a:r>
           </a:p>
@@ -2602,7 +2588,7 @@
           <a:p>
             <a:fld id="{6A29D861-A055-3243-B891-3209160CEC37}" type="datetimeFigureOut">
               <a:rPr kumimoji="1" lang="ja-JP" altLang="en-US" smtClean="0"/>
-              <a:t>2018/1/11</a:t>
+              <a:t>2018/3/5</a:t>
             </a:fld>
             <a:endParaRPr kumimoji="1" lang="ja-JP" altLang="en-US"/>
           </a:p>
@@ -2711,10 +2697,9 @@
           <a:lstStyle/>
           <a:p>
             <a:r>
-              <a:rPr kumimoji="1" lang="ja-JP" altLang="en-US" smtClean="0"/>
+              <a:rPr kumimoji="1" lang="ja-JP" altLang="en-US"/>
               <a:t>マスター タイトルの書式設定</a:t>
             </a:r>
-            <a:endParaRPr kumimoji="1" lang="ja-JP" altLang="en-US"/>
           </a:p>
         </p:txBody>
       </p:sp>
@@ -2745,70 +2730,69 @@
           <a:p>
             <a:pPr lvl="0"/>
             <a:r>
-              <a:rPr kumimoji="1" lang="ja-JP" altLang="en-US" smtClean="0"/>
+              <a:rPr kumimoji="1" lang="ja-JP" altLang="en-US"/>
               <a:t>マスター テキストの書式設定</a:t>
             </a:r>
           </a:p>
           <a:p>
             <a:pPr lvl="1"/>
             <a:r>
-              <a:rPr kumimoji="1" lang="ja-JP" altLang="en-US" smtClean="0"/>
+              <a:rPr kumimoji="1" lang="ja-JP" altLang="en-US"/>
               <a:t>第 </a:t>
             </a:r>
             <a:r>
-              <a:rPr kumimoji="1" lang="en-US" altLang="ja-JP" smtClean="0"/>
+              <a:rPr kumimoji="1" lang="en-US" altLang="ja-JP"/>
               <a:t>2 </a:t>
             </a:r>
             <a:r>
-              <a:rPr kumimoji="1" lang="ja-JP" altLang="en-US" smtClean="0"/>
+              <a:rPr kumimoji="1" lang="ja-JP" altLang="en-US"/>
               <a:t>レベル</a:t>
             </a:r>
           </a:p>
           <a:p>
             <a:pPr lvl="2"/>
             <a:r>
-              <a:rPr kumimoji="1" lang="ja-JP" altLang="en-US" smtClean="0"/>
+              <a:rPr kumimoji="1" lang="ja-JP" altLang="en-US"/>
               <a:t>第 </a:t>
             </a:r>
             <a:r>
-              <a:rPr kumimoji="1" lang="en-US" altLang="ja-JP" smtClean="0"/>
+              <a:rPr kumimoji="1" lang="en-US" altLang="ja-JP"/>
               <a:t>3 </a:t>
             </a:r>
             <a:r>
-              <a:rPr kumimoji="1" lang="ja-JP" altLang="en-US" smtClean="0"/>
+              <a:rPr kumimoji="1" lang="ja-JP" altLang="en-US"/>
               <a:t>レベル</a:t>
             </a:r>
           </a:p>
           <a:p>
             <a:pPr lvl="3"/>
             <a:r>
-              <a:rPr kumimoji="1" lang="ja-JP" altLang="en-US" smtClean="0"/>
+              <a:rPr kumimoji="1" lang="ja-JP" altLang="en-US"/>
               <a:t>第 </a:t>
             </a:r>
             <a:r>
-              <a:rPr kumimoji="1" lang="en-US" altLang="ja-JP" smtClean="0"/>
+              <a:rPr kumimoji="1" lang="en-US" altLang="ja-JP"/>
               <a:t>4 </a:t>
             </a:r>
             <a:r>
-              <a:rPr kumimoji="1" lang="ja-JP" altLang="en-US" smtClean="0"/>
+              <a:rPr kumimoji="1" lang="ja-JP" altLang="en-US"/>
               <a:t>レベル</a:t>
             </a:r>
           </a:p>
           <a:p>
             <a:pPr lvl="4"/>
             <a:r>
-              <a:rPr kumimoji="1" lang="ja-JP" altLang="en-US" smtClean="0"/>
+              <a:rPr kumimoji="1" lang="ja-JP" altLang="en-US"/>
               <a:t>第 </a:t>
             </a:r>
             <a:r>
-              <a:rPr kumimoji="1" lang="en-US" altLang="ja-JP" smtClean="0"/>
+              <a:rPr kumimoji="1" lang="en-US" altLang="ja-JP"/>
               <a:t>5 </a:t>
             </a:r>
             <a:r>
-              <a:rPr kumimoji="1" lang="ja-JP" altLang="en-US" smtClean="0"/>
+              <a:rPr kumimoji="1" lang="ja-JP" altLang="en-US"/>
               <a:t>レベル</a:t>
             </a:r>
-            <a:endParaRPr kumimoji="1" lang="ja-JP" altLang="en-US"/>
           </a:p>
         </p:txBody>
       </p:sp>
@@ -2847,7 +2831,7 @@
           <a:p>
             <a:fld id="{6A29D861-A055-3243-B891-3209160CEC37}" type="datetimeFigureOut">
               <a:rPr kumimoji="1" lang="ja-JP" altLang="en-US" smtClean="0"/>
-              <a:t>2018/1/11</a:t>
+              <a:t>2018/3/5</a:t>
             </a:fld>
             <a:endParaRPr kumimoji="1" lang="ja-JP" altLang="en-US"/>
           </a:p>
@@ -3254,13 +3238,100 @@
       </p:grpSpPr>
       <p:sp>
         <p:nvSpPr>
+          <p:cNvPr id="21" name="角丸四角形 20">
+            <a:extLst>
+              <a:ext uri="{FF2B5EF4-FFF2-40B4-BE49-F238E27FC236}">
+                <a16:creationId xmlns:a16="http://schemas.microsoft.com/office/drawing/2014/main" id="{B5D27BBE-771C-D140-9EFB-1A65D6721C8A}"/>
+              </a:ext>
+            </a:extLst>
+          </p:cNvPr>
+          <p:cNvSpPr/>
+          <p:nvPr/>
+        </p:nvSpPr>
+        <p:spPr>
+          <a:xfrm>
+            <a:off x="3632200" y="851925"/>
+            <a:ext cx="6671732" cy="4363542"/>
+          </a:xfrm>
+          <a:prstGeom prst="roundRect">
+            <a:avLst>
+              <a:gd name="adj" fmla="val 3659"/>
+            </a:avLst>
+          </a:prstGeom>
+          <a:solidFill>
+            <a:schemeClr val="bg2"/>
+          </a:solidFill>
+        </p:spPr>
+        <p:style>
+          <a:lnRef idx="2">
+            <a:schemeClr val="accent1">
+              <a:shade val="50000"/>
+            </a:schemeClr>
+          </a:lnRef>
+          <a:fillRef idx="1">
+            <a:schemeClr val="accent1"/>
+          </a:fillRef>
+          <a:effectRef idx="0">
+            <a:schemeClr val="accent1"/>
+          </a:effectRef>
+          <a:fontRef idx="minor">
+            <a:schemeClr val="lt1"/>
+          </a:fontRef>
+        </p:style>
+        <p:txBody>
+          <a:bodyPr rtlCol="0" anchor="ctr"/>
+          <a:lstStyle/>
+          <a:p>
+            <a:pPr algn="ctr"/>
+            <a:endParaRPr lang="en-US" altLang="ja-JP" dirty="0">
+              <a:solidFill>
+                <a:schemeClr val="tx1"/>
+              </a:solidFill>
+            </a:endParaRPr>
+          </a:p>
+          <a:p>
+            <a:pPr algn="ctr"/>
+            <a:endParaRPr lang="en-US" altLang="ja-JP" dirty="0">
+              <a:solidFill>
+                <a:schemeClr val="tx1"/>
+              </a:solidFill>
+            </a:endParaRPr>
+          </a:p>
+          <a:p>
+            <a:pPr algn="ctr"/>
+            <a:endParaRPr lang="en-US" altLang="ja-JP" dirty="0">
+              <a:solidFill>
+                <a:schemeClr val="tx1"/>
+              </a:solidFill>
+            </a:endParaRPr>
+          </a:p>
+          <a:p>
+            <a:pPr algn="ctr"/>
+            <a:endParaRPr lang="en-US" altLang="ja-JP" dirty="0">
+              <a:solidFill>
+                <a:schemeClr val="tx1"/>
+              </a:solidFill>
+            </a:endParaRPr>
+          </a:p>
+          <a:p>
+            <a:pPr algn="ctr"/>
+            <a:endParaRPr lang="en-US" altLang="ja-JP" dirty="0">
+              <a:solidFill>
+                <a:schemeClr val="tx1"/>
+              </a:solidFill>
+            </a:endParaRPr>
+          </a:p>
+        </p:txBody>
+      </p:sp>
+      <p:sp>
+        <p:nvSpPr>
           <p:cNvPr id="4" name="雲 3"/>
           <p:cNvSpPr/>
           <p:nvPr/>
         </p:nvSpPr>
         <p:spPr>
           <a:xfrm>
-            <a:off x="7949556" y="1121862"/>
+            <a:off x="7949556" y="537226"/>
             <a:ext cx="1796327" cy="889000"/>
           </a:xfrm>
           <a:prstGeom prst="cloud">
@@ -3289,7 +3360,7 @@
           <a:p>
             <a:pPr algn="ctr"/>
             <a:r>
-              <a:rPr kumimoji="1" lang="en-US" altLang="ja-JP" smtClean="0"/>
+              <a:rPr kumimoji="1" lang="en-US" altLang="ja-JP"/>
               <a:t>AWS API</a:t>
             </a:r>
             <a:endParaRPr kumimoji="1" lang="ja-JP" altLang="en-US" dirty="0"/>
@@ -3340,7 +3411,7 @@
           <a:lstStyle/>
           <a:p>
             <a:pPr algn="ctr"/>
-            <a:endParaRPr lang="en-US" altLang="ja-JP" dirty="0" smtClean="0">
+            <a:endParaRPr lang="en-US" altLang="ja-JP" dirty="0">
               <a:solidFill>
                 <a:schemeClr val="tx1"/>
               </a:solidFill>
@@ -3356,7 +3427,7 @@
           </a:p>
           <a:p>
             <a:pPr algn="ctr"/>
-            <a:endParaRPr lang="en-US" altLang="ja-JP" dirty="0" smtClean="0">
+            <a:endParaRPr lang="en-US" altLang="ja-JP" dirty="0">
               <a:solidFill>
                 <a:schemeClr val="tx1"/>
               </a:solidFill>
@@ -3372,7 +3443,7 @@
           </a:p>
           <a:p>
             <a:pPr algn="ctr"/>
-            <a:endParaRPr lang="en-US" altLang="ja-JP" dirty="0" smtClean="0">
+            <a:endParaRPr lang="en-US" altLang="ja-JP" dirty="0">
               <a:solidFill>
                 <a:schemeClr val="tx1"/>
               </a:solidFill>
@@ -3381,7 +3452,7 @@
           <a:p>
             <a:pPr algn="ctr"/>
             <a:r>
-              <a:rPr lang="en-US" altLang="ja-JP" dirty="0" err="1" smtClean="0">
+              <a:rPr lang="en-US" altLang="ja-JP" dirty="0" err="1">
                 <a:solidFill>
                   <a:schemeClr val="tx1"/>
                 </a:solidFill>
@@ -3389,7 +3460,7 @@
               <a:t>bation</a:t>
             </a:r>
             <a:r>
-              <a:rPr lang="ja-JP" altLang="en-US" dirty="0" smtClean="0">
+              <a:rPr lang="ja-JP" altLang="en-US" dirty="0">
                 <a:solidFill>
                   <a:schemeClr val="tx1"/>
                 </a:solidFill>
@@ -3448,15 +3519,7 @@
           <a:lstStyle/>
           <a:p>
             <a:pPr algn="ctr"/>
-            <a:endParaRPr kumimoji="1" lang="en-US" altLang="ja-JP" dirty="0" smtClean="0">
-              <a:solidFill>
-                <a:sysClr val="windowText" lastClr="000000"/>
-              </a:solidFill>
-            </a:endParaRPr>
-          </a:p>
-          <a:p>
-            <a:pPr algn="ctr"/>
-            <a:endParaRPr lang="en-US" altLang="ja-JP" dirty="0" smtClean="0">
+            <a:endParaRPr kumimoji="1" lang="en-US" altLang="ja-JP" dirty="0">
               <a:solidFill>
                 <a:sysClr val="windowText" lastClr="000000"/>
               </a:solidFill>
@@ -3472,8 +3535,16 @@
           </a:p>
           <a:p>
             <a:pPr algn="ctr"/>
-            <a:r>
-              <a:rPr kumimoji="1" lang="en-US" altLang="ja-JP" dirty="0" err="1" smtClean="0">
+            <a:endParaRPr lang="en-US" altLang="ja-JP" dirty="0">
+              <a:solidFill>
+                <a:sysClr val="windowText" lastClr="000000"/>
+              </a:solidFill>
+            </a:endParaRPr>
+          </a:p>
+          <a:p>
+            <a:pPr algn="ctr"/>
+            <a:r>
+              <a:rPr kumimoji="1" lang="en-US" altLang="ja-JP" dirty="0" err="1">
                 <a:solidFill>
                   <a:sysClr val="windowText" lastClr="000000"/>
                 </a:solidFill>
@@ -3481,7 +3552,7 @@
               <a:t>Jupyter</a:t>
             </a:r>
             <a:r>
-              <a:rPr lang="ja-JP" altLang="en-US" dirty="0" smtClean="0">
+              <a:rPr lang="ja-JP" altLang="en-US" dirty="0">
                 <a:solidFill>
                   <a:sysClr val="windowText" lastClr="000000"/>
                 </a:solidFill>
@@ -3541,7 +3612,7 @@
           <a:p>
             <a:pPr algn="ctr"/>
             <a:r>
-              <a:rPr kumimoji="1" lang="en-US" altLang="ja-JP" sz="1200" dirty="0" smtClean="0">
+              <a:rPr kumimoji="1" lang="en-US" altLang="ja-JP" sz="1200" dirty="0">
                 <a:solidFill>
                   <a:sysClr val="windowText" lastClr="000000"/>
                 </a:solidFill>
@@ -3601,7 +3672,7 @@
           <a:p>
             <a:pPr algn="ctr"/>
             <a:r>
-              <a:rPr kumimoji="1" lang="en-US" altLang="ja-JP" sz="1200" dirty="0" err="1" smtClean="0">
+              <a:rPr kumimoji="1" lang="en-US" altLang="ja-JP" sz="1200" dirty="0" err="1">
                 <a:solidFill>
                   <a:sysClr val="windowText" lastClr="000000"/>
                 </a:solidFill>
@@ -3620,20 +3691,26 @@
         <p:nvCxnSpPr>
           <p:cNvPr id="12" name="カギ線コネクタ 11"/>
           <p:cNvCxnSpPr>
-            <a:stCxn id="10" idx="3"/>
-            <a:endCxn id="4" idx="2"/>
+            <a:cxnSpLocks/>
+            <a:stCxn id="10" idx="0"/>
+            <a:endCxn id="4" idx="3"/>
           </p:cNvCxnSpPr>
           <p:nvPr/>
         </p:nvCxnSpPr>
         <p:spPr>
-          <a:xfrm flipV="1">
-            <a:off x="5897440" y="1566362"/>
-            <a:ext cx="2057688" cy="624965"/>
+          <a:xfrm rot="5400000" flipH="1" flipV="1">
+            <a:off x="6526421" y="-466376"/>
+            <a:ext cx="1266868" cy="3375730"/>
           </a:xfrm>
           <a:prstGeom prst="bentConnector3">
-            <a:avLst/>
+            <a:avLst>
+              <a:gd name="adj1" fmla="val 122057"/>
+            </a:avLst>
           </a:prstGeom>
-          <a:ln>
+          <a:ln w="38100">
+            <a:solidFill>
+              <a:srgbClr val="C00000"/>
+            </a:solidFill>
             <a:tailEnd type="triangle"/>
           </a:ln>
         </p:spPr>
@@ -3697,7 +3774,7 @@
           <a:p>
             <a:pPr algn="ctr"/>
             <a:r>
-              <a:rPr lang="en-US" altLang="ja-JP" dirty="0" err="1" smtClean="0">
+              <a:rPr lang="en-US" altLang="ja-JP" dirty="0" err="1">
                 <a:solidFill>
                   <a:schemeClr val="tx1"/>
                 </a:solidFill>
@@ -3705,7 +3782,7 @@
               <a:t>ansible</a:t>
             </a:r>
             <a:r>
-              <a:rPr lang="en-US" altLang="ja-JP" dirty="0" smtClean="0">
+              <a:rPr lang="en-US" altLang="ja-JP" dirty="0">
                 <a:solidFill>
                   <a:schemeClr val="tx1"/>
                 </a:solidFill>
@@ -3716,18 +3793,13 @@
           <a:p>
             <a:pPr algn="ctr"/>
             <a:r>
-              <a:rPr kumimoji="1" lang="ja-JP" altLang="en-US" dirty="0" smtClean="0">
+              <a:rPr kumimoji="1" lang="ja-JP" altLang="en-US" dirty="0">
                 <a:solidFill>
                   <a:schemeClr val="tx1"/>
                 </a:solidFill>
               </a:rPr>
               <a:t>サーバ</a:t>
             </a:r>
-            <a:endParaRPr kumimoji="1" lang="ja-JP" altLang="en-US" dirty="0">
-              <a:solidFill>
-                <a:schemeClr val="tx1"/>
-              </a:solidFill>
-            </a:endParaRPr>
           </a:p>
         </p:txBody>
       </p:sp>
@@ -3776,7 +3848,7 @@
           <a:p>
             <a:pPr algn="ctr"/>
             <a:r>
-              <a:rPr lang="en-US" altLang="ja-JP" dirty="0" err="1" smtClean="0">
+              <a:rPr lang="en-US" altLang="ja-JP" dirty="0" err="1">
                 <a:solidFill>
                   <a:schemeClr val="tx1"/>
                 </a:solidFill>
@@ -3784,7 +3856,7 @@
               <a:t>ansible</a:t>
             </a:r>
             <a:r>
-              <a:rPr lang="en-US" altLang="ja-JP" dirty="0" smtClean="0">
+              <a:rPr lang="en-US" altLang="ja-JP" dirty="0">
                 <a:solidFill>
                   <a:schemeClr val="tx1"/>
                 </a:solidFill>
@@ -3795,18 +3867,13 @@
           <a:p>
             <a:pPr algn="ctr"/>
             <a:r>
-              <a:rPr kumimoji="1" lang="ja-JP" altLang="en-US" dirty="0" smtClean="0">
+              <a:rPr kumimoji="1" lang="ja-JP" altLang="en-US" dirty="0">
                 <a:solidFill>
                   <a:schemeClr val="tx1"/>
                 </a:solidFill>
               </a:rPr>
               <a:t>サーバ</a:t>
             </a:r>
-            <a:endParaRPr kumimoji="1" lang="ja-JP" altLang="en-US" dirty="0">
-              <a:solidFill>
-                <a:schemeClr val="tx1"/>
-              </a:solidFill>
-            </a:endParaRPr>
           </a:p>
         </p:txBody>
       </p:sp>
@@ -3827,7 +3894,10 @@
           <a:prstGeom prst="bentConnector3">
             <a:avLst/>
           </a:prstGeom>
-          <a:ln>
+          <a:ln w="38100">
+            <a:solidFill>
+              <a:srgbClr val="C00000"/>
+            </a:solidFill>
             <a:tailEnd type="triangle"/>
           </a:ln>
         </p:spPr>
@@ -3863,7 +3933,10 @@
           <a:prstGeom prst="bentConnector3">
             <a:avLst/>
           </a:prstGeom>
-          <a:ln>
+          <a:ln w="38100">
+            <a:solidFill>
+              <a:srgbClr val="C00000"/>
+            </a:solidFill>
             <a:tailEnd type="triangle"/>
           </a:ln>
         </p:spPr>
@@ -3893,12 +3966,12 @@
         </p:nvCxnSpPr>
         <p:spPr>
           <a:xfrm>
-            <a:off x="9744386" y="1566362"/>
-            <a:ext cx="1498" cy="1518473"/>
+            <a:off x="9744386" y="981726"/>
+            <a:ext cx="1498" cy="2103109"/>
           </a:xfrm>
           <a:prstGeom prst="bentConnector3">
             <a:avLst>
-              <a:gd name="adj1" fmla="val 50903405"/>
+              <a:gd name="adj1" fmla="val 15360347"/>
             </a:avLst>
           </a:prstGeom>
           <a:ln>
@@ -3932,12 +4005,12 @@
         </p:nvCxnSpPr>
         <p:spPr>
           <a:xfrm>
-            <a:off x="9744386" y="1566362"/>
-            <a:ext cx="1498" cy="2872711"/>
+            <a:off x="9744386" y="981726"/>
+            <a:ext cx="1498" cy="3457347"/>
           </a:xfrm>
           <a:prstGeom prst="bentConnector3">
             <a:avLst>
-              <a:gd name="adj1" fmla="val 50903405"/>
+              <a:gd name="adj1" fmla="val 15360347"/>
             </a:avLst>
           </a:prstGeom>
           <a:ln>
@@ -4037,7 +4110,7 @@
           <a:prstGeom prst="bentConnector3">
             <a:avLst/>
           </a:prstGeom>
-          <a:ln>
+          <a:ln w="38100">
             <a:tailEnd type="triangle"/>
           </a:ln>
         </p:spPr>
@@ -4056,6 +4129,130 @@
           </a:fontRef>
         </p:style>
       </p:cxnSp>
+      <p:sp>
+        <p:nvSpPr>
+          <p:cNvPr id="16" name="テキスト ボックス 15">
+            <a:extLst>
+              <a:ext uri="{FF2B5EF4-FFF2-40B4-BE49-F238E27FC236}">
+                <a16:creationId xmlns:a16="http://schemas.microsoft.com/office/drawing/2014/main" id="{88532197-BD16-AD48-910B-12B2C3F2FB6A}"/>
+              </a:ext>
+            </a:extLst>
+          </p:cNvPr>
+          <p:cNvSpPr txBox="1"/>
+          <p:nvPr/>
+        </p:nvSpPr>
+        <p:spPr>
+          <a:xfrm>
+            <a:off x="1755507" y="1847180"/>
+            <a:ext cx="1800493" cy="307777"/>
+          </a:xfrm>
+          <a:prstGeom prst="rect">
+            <a:avLst/>
+          </a:prstGeom>
+          <a:noFill/>
+        </p:spPr>
+        <p:txBody>
+          <a:bodyPr wrap="none" rtlCol="0">
+            <a:spAutoFit/>
+          </a:bodyPr>
+          <a:lstStyle/>
+          <a:p>
+            <a:r>
+              <a:rPr lang="ja-JP" altLang="en-US" sz="1400" dirty="0"/>
+              <a:t>ブラウザでアクセス</a:t>
+            </a:r>
+            <a:endParaRPr kumimoji="1" lang="ja-JP" altLang="en-US" sz="1400" dirty="0"/>
+          </a:p>
+        </p:txBody>
+      </p:sp>
+      <p:sp>
+        <p:nvSpPr>
+          <p:cNvPr id="24" name="テキスト ボックス 23">
+            <a:extLst>
+              <a:ext uri="{FF2B5EF4-FFF2-40B4-BE49-F238E27FC236}">
+                <a16:creationId xmlns:a16="http://schemas.microsoft.com/office/drawing/2014/main" id="{3BC8461A-2E8A-6441-B40F-9C239522246D}"/>
+              </a:ext>
+            </a:extLst>
+          </p:cNvPr>
+          <p:cNvSpPr txBox="1"/>
+          <p:nvPr/>
+        </p:nvSpPr>
+        <p:spPr>
+          <a:xfrm>
+            <a:off x="6391476" y="1863959"/>
+            <a:ext cx="1385316" cy="307777"/>
+          </a:xfrm>
+          <a:prstGeom prst="rect">
+            <a:avLst/>
+          </a:prstGeom>
+          <a:noFill/>
+        </p:spPr>
+        <p:txBody>
+          <a:bodyPr wrap="none" rtlCol="0">
+            <a:spAutoFit/>
+          </a:bodyPr>
+          <a:lstStyle/>
+          <a:p>
+            <a:r>
+              <a:rPr lang="en-US" altLang="ja-JP" sz="1400" dirty="0" err="1"/>
+              <a:t>Ansible</a:t>
+            </a:r>
+            <a:r>
+              <a:rPr lang="en-US" altLang="ja-JP" sz="1400" dirty="0"/>
+              <a:t> </a:t>
+            </a:r>
+            <a:r>
+              <a:rPr lang="ja-JP" altLang="en-US" sz="1400" dirty="0"/>
+              <a:t>で操作</a:t>
+            </a:r>
+            <a:endParaRPr kumimoji="1" lang="ja-JP" altLang="en-US" sz="1400" dirty="0"/>
+          </a:p>
+        </p:txBody>
+      </p:sp>
+      <p:sp>
+        <p:nvSpPr>
+          <p:cNvPr id="25" name="テキスト ボックス 24">
+            <a:extLst>
+              <a:ext uri="{FF2B5EF4-FFF2-40B4-BE49-F238E27FC236}">
+                <a16:creationId xmlns:a16="http://schemas.microsoft.com/office/drawing/2014/main" id="{47C634A6-C352-7F41-81E1-D4A09CD5199E}"/>
+              </a:ext>
+            </a:extLst>
+          </p:cNvPr>
+          <p:cNvSpPr txBox="1"/>
+          <p:nvPr/>
+        </p:nvSpPr>
+        <p:spPr>
+          <a:xfrm>
+            <a:off x="6467197" y="383337"/>
+            <a:ext cx="1385316" cy="307777"/>
+          </a:xfrm>
+          <a:prstGeom prst="rect">
+            <a:avLst/>
+          </a:prstGeom>
+          <a:noFill/>
+        </p:spPr>
+        <p:txBody>
+          <a:bodyPr wrap="none" rtlCol="0">
+            <a:spAutoFit/>
+          </a:bodyPr>
+          <a:lstStyle/>
+          <a:p>
+            <a:r>
+              <a:rPr lang="en-US" altLang="ja-JP" sz="1400" dirty="0" err="1"/>
+              <a:t>Ansible</a:t>
+            </a:r>
+            <a:r>
+              <a:rPr lang="en-US" altLang="ja-JP" sz="1400" dirty="0"/>
+              <a:t> </a:t>
+            </a:r>
+            <a:r>
+              <a:rPr lang="ja-JP" altLang="en-US" sz="1400" dirty="0"/>
+              <a:t>で操作</a:t>
+            </a:r>
+            <a:endParaRPr kumimoji="1" lang="ja-JP" altLang="en-US" sz="1400" dirty="0"/>
+          </a:p>
+        </p:txBody>
+      </p:sp>
     </p:spTree>
     <p:extLst>
       <p:ext uri="{BB962C8B-B14F-4D97-AF65-F5344CB8AC3E}">

</xml_diff>